<commit_message>
fixed missing images in recursion ppt
</commit_message>
<xml_diff>
--- a/First Meeting - Recursion - 08-30-2017/Algo-Club-Recursion-08-30-2017.pptx
+++ b/First Meeting - Recursion - 08-30-2017/Algo-Club-Recursion-08-30-2017.pptx
@@ -219,7 +219,7 @@
           <a:p>
             <a:fld id="{D65A4144-0AFD-B449-AB1C-F578077FB2D3}" type="datetimeFigureOut">
               <a:rPr lang="en-US" smtClean="0"/>
-              <a:t>8/30/17</a:t>
+              <a:t>8/31/17</a:t>
             </a:fld>
             <a:endParaRPr lang="en-US"/>
           </a:p>
@@ -1156,7 +1156,7 @@
           <a:p>
             <a:fld id="{8591831E-C1DF-764D-AE0B-CE173753AF0D}" type="datetimeFigureOut">
               <a:rPr lang="en-US" smtClean="0"/>
-              <a:t>8/30/17</a:t>
+              <a:t>8/31/17</a:t>
             </a:fld>
             <a:endParaRPr lang="en-US"/>
           </a:p>
@@ -1331,7 +1331,7 @@
           <a:p>
             <a:fld id="{8591831E-C1DF-764D-AE0B-CE173753AF0D}" type="datetimeFigureOut">
               <a:rPr lang="en-US" smtClean="0"/>
-              <a:t>8/30/17</a:t>
+              <a:t>8/31/17</a:t>
             </a:fld>
             <a:endParaRPr lang="en-US"/>
           </a:p>
@@ -1507,7 +1507,7 @@
           <a:p>
             <a:fld id="{8591831E-C1DF-764D-AE0B-CE173753AF0D}" type="datetimeFigureOut">
               <a:rPr lang="en-US" smtClean="0"/>
-              <a:t>8/30/17</a:t>
+              <a:t>8/31/17</a:t>
             </a:fld>
             <a:endParaRPr lang="en-US"/>
           </a:p>
@@ -1673,7 +1673,7 @@
           <a:p>
             <a:fld id="{8591831E-C1DF-764D-AE0B-CE173753AF0D}" type="datetimeFigureOut">
               <a:rPr lang="en-US" smtClean="0"/>
-              <a:t>8/30/17</a:t>
+              <a:t>8/31/17</a:t>
             </a:fld>
             <a:endParaRPr lang="en-US"/>
           </a:p>
@@ -1990,7 +1990,7 @@
           <a:p>
             <a:fld id="{8591831E-C1DF-764D-AE0B-CE173753AF0D}" type="datetimeFigureOut">
               <a:rPr lang="en-US" smtClean="0"/>
-              <a:t>8/30/17</a:t>
+              <a:t>8/31/17</a:t>
             </a:fld>
             <a:endParaRPr lang="en-US"/>
           </a:p>
@@ -2446,7 +2446,7 @@
           <a:p>
             <a:fld id="{8591831E-C1DF-764D-AE0B-CE173753AF0D}" type="datetimeFigureOut">
               <a:rPr lang="en-US" smtClean="0"/>
-              <a:t>8/30/17</a:t>
+              <a:t>8/31/17</a:t>
             </a:fld>
             <a:endParaRPr lang="en-US"/>
           </a:p>
@@ -2853,7 +2853,7 @@
           <a:p>
             <a:fld id="{8591831E-C1DF-764D-AE0B-CE173753AF0D}" type="datetimeFigureOut">
               <a:rPr lang="en-US" smtClean="0"/>
-              <a:t>8/30/17</a:t>
+              <a:t>8/31/17</a:t>
             </a:fld>
             <a:endParaRPr lang="en-US"/>
           </a:p>
@@ -2967,7 +2967,7 @@
           <a:p>
             <a:fld id="{8591831E-C1DF-764D-AE0B-CE173753AF0D}" type="datetimeFigureOut">
               <a:rPr lang="en-US" smtClean="0"/>
-              <a:t>8/30/17</a:t>
+              <a:t>8/31/17</a:t>
             </a:fld>
             <a:endParaRPr lang="en-US"/>
           </a:p>
@@ -3081,7 +3081,7 @@
           <a:p>
             <a:fld id="{8591831E-C1DF-764D-AE0B-CE173753AF0D}" type="datetimeFigureOut">
               <a:rPr lang="en-US" smtClean="0"/>
-              <a:t>8/30/17</a:t>
+              <a:t>8/31/17</a:t>
             </a:fld>
             <a:endParaRPr lang="en-US"/>
           </a:p>
@@ -3435,7 +3435,7 @@
           <a:p>
             <a:fld id="{8591831E-C1DF-764D-AE0B-CE173753AF0D}" type="datetimeFigureOut">
               <a:rPr lang="en-US" smtClean="0"/>
-              <a:t>8/30/17</a:t>
+              <a:t>8/31/17</a:t>
             </a:fld>
             <a:endParaRPr lang="en-US"/>
           </a:p>
@@ -3938,7 +3938,7 @@
           <a:p>
             <a:fld id="{8591831E-C1DF-764D-AE0B-CE173753AF0D}" type="datetimeFigureOut">
               <a:rPr lang="en-US" smtClean="0"/>
-              <a:t>8/30/17</a:t>
+              <a:t>8/31/17</a:t>
             </a:fld>
             <a:endParaRPr lang="en-US"/>
           </a:p>
@@ -4289,7 +4289,7 @@
           <a:p>
             <a:fld id="{8591831E-C1DF-764D-AE0B-CE173753AF0D}" type="datetimeFigureOut">
               <a:rPr lang="en-US" smtClean="0"/>
-              <a:t>8/30/17</a:t>
+              <a:t>8/31/17</a:t>
             </a:fld>
             <a:endParaRPr lang="en-US"/>
           </a:p>
@@ -7230,7 +7230,7 @@
             <a:p>
               <a:pPr algn="ctr"/>
               <a:r>
-                <a:rPr lang="en-US" sz="3600" b="1" cap="none" spc="0" smtClean="0">
+                <a:rPr lang="en-US" sz="3600" b="1" cap="none" spc="0" dirty="0" smtClean="0">
                   <a:ln w="12700">
                     <a:solidFill>
                       <a:schemeClr val="accent1"/>
@@ -8015,22 +8015,28 @@
       </p:sp>
       <p:pic>
         <p:nvPicPr>
-          <p:cNvPr id="117" name="Picture 116"/>
+          <p:cNvPr id="5" name="Picture 4"/>
           <p:cNvPicPr>
             <a:picLocks noChangeAspect="1"/>
           </p:cNvPicPr>
           <p:nvPr/>
         </p:nvPicPr>
         <p:blipFill>
-          <a:blip r:embed="rId2"/>
+          <a:blip r:embed="rId2">
+            <a:extLst>
+              <a:ext uri="{28A0092B-C50C-407E-A947-70E740481C1C}">
+                <a14:useLocalDpi xmlns:a14="http://schemas.microsoft.com/office/drawing/2010/main" val="0"/>
+              </a:ext>
+            </a:extLst>
+          </a:blip>
           <a:stretch>
             <a:fillRect/>
           </a:stretch>
         </p:blipFill>
         <p:spPr>
           <a:xfrm>
-            <a:off x="838200" y="2396971"/>
-            <a:ext cx="6720076" cy="2665684"/>
+            <a:off x="1061885" y="2365000"/>
+            <a:ext cx="7122559" cy="2811537"/>
           </a:xfrm>
           <a:prstGeom prst="rect">
             <a:avLst/>
@@ -11786,7 +11792,7 @@
       </p:sp>
       <p:pic>
         <p:nvPicPr>
-          <p:cNvPr id="4" name="Picture 3"/>
+          <p:cNvPr id="5" name="Picture 4"/>
           <p:cNvPicPr>
             <a:picLocks noChangeAspect="1"/>
           </p:cNvPicPr>
@@ -11800,8 +11806,8 @@
         </p:blipFill>
         <p:spPr>
           <a:xfrm>
-            <a:off x="8474189" y="287560"/>
-            <a:ext cx="3407286" cy="5301737"/>
+            <a:off x="8512686" y="648997"/>
+            <a:ext cx="3175000" cy="4940300"/>
           </a:xfrm>
           <a:prstGeom prst="rect">
             <a:avLst/>
@@ -11896,30 +11902,6 @@
           </a:p>
         </p:txBody>
       </p:sp>
-      <p:pic>
-        <p:nvPicPr>
-          <p:cNvPr id="4" name="Picture 3"/>
-          <p:cNvPicPr>
-            <a:picLocks noChangeAspect="1"/>
-          </p:cNvPicPr>
-          <p:nvPr/>
-        </p:nvPicPr>
-        <p:blipFill>
-          <a:blip r:embed="rId2"/>
-          <a:stretch>
-            <a:fillRect/>
-          </a:stretch>
-        </p:blipFill>
-        <p:spPr>
-          <a:xfrm>
-            <a:off x="8474189" y="287560"/>
-            <a:ext cx="3407286" cy="5301737"/>
-          </a:xfrm>
-          <a:prstGeom prst="rect">
-            <a:avLst/>
-          </a:prstGeom>
-        </p:spPr>
-      </p:pic>
       <p:sp>
         <p:nvSpPr>
           <p:cNvPr id="5" name="Rectangle 4"/>
@@ -11959,19 +11941,6 @@
               </a:rPr>
               <a:t>Warm Up</a:t>
             </a:r>
-            <a:endParaRPr lang="en-US" sz="4000" b="0" cap="none" spc="0" dirty="0" smtClean="0">
-              <a:ln w="0"/>
-              <a:solidFill>
-                <a:schemeClr val="accent1"/>
-              </a:solidFill>
-              <a:effectLst>
-                <a:outerShdw blurRad="38100" dist="25400" dir="5400000" algn="ctr" rotWithShape="0">
-                  <a:srgbClr val="6E747A">
-                    <a:alpha val="43000"/>
-                  </a:srgbClr>
-                </a:outerShdw>
-              </a:effectLst>
-            </a:endParaRPr>
           </a:p>
           <a:p>
             <a:pPr marL="742950" lvl="2" indent="-285750">
@@ -12045,6 +12014,30 @@
           </a:p>
         </p:txBody>
       </p:sp>
+      <p:pic>
+        <p:nvPicPr>
+          <p:cNvPr id="6" name="Picture 5"/>
+          <p:cNvPicPr>
+            <a:picLocks noChangeAspect="1"/>
+          </p:cNvPicPr>
+          <p:nvPr/>
+        </p:nvPicPr>
+        <p:blipFill>
+          <a:blip r:embed="rId2"/>
+          <a:stretch>
+            <a:fillRect/>
+          </a:stretch>
+        </p:blipFill>
+        <p:spPr>
+          <a:xfrm>
+            <a:off x="8512686" y="648997"/>
+            <a:ext cx="3175000" cy="4940300"/>
+          </a:xfrm>
+          <a:prstGeom prst="rect">
+            <a:avLst/>
+          </a:prstGeom>
+        </p:spPr>
+      </p:pic>
     </p:spTree>
     <p:extLst>
       <p:ext uri="{BB962C8B-B14F-4D97-AF65-F5344CB8AC3E}">
@@ -12082,6 +12075,36 @@
           <a:chExt cx="0" cy="0"/>
         </a:xfrm>
       </p:grpSpPr>
+      <p:pic>
+        <p:nvPicPr>
+          <p:cNvPr id="7" name="Picture 6"/>
+          <p:cNvPicPr>
+            <a:picLocks noChangeAspect="1"/>
+          </p:cNvPicPr>
+          <p:nvPr/>
+        </p:nvPicPr>
+        <p:blipFill>
+          <a:blip r:embed="rId2">
+            <a:extLst>
+              <a:ext uri="{28A0092B-C50C-407E-A947-70E740481C1C}">
+                <a14:useLocalDpi xmlns:a14="http://schemas.microsoft.com/office/drawing/2010/main" val="0"/>
+              </a:ext>
+            </a:extLst>
+          </a:blip>
+          <a:stretch>
+            <a:fillRect/>
+          </a:stretch>
+        </p:blipFill>
+        <p:spPr>
+          <a:xfrm>
+            <a:off x="4470730" y="2898758"/>
+            <a:ext cx="3708543" cy="2040680"/>
+          </a:xfrm>
+          <a:prstGeom prst="rect">
+            <a:avLst/>
+          </a:prstGeom>
+        </p:spPr>
+      </p:pic>
       <p:sp>
         <p:nvSpPr>
           <p:cNvPr id="2" name="Title 1"/>
@@ -12133,30 +12156,6 @@
           </a:p>
         </p:txBody>
       </p:sp>
-      <p:pic>
-        <p:nvPicPr>
-          <p:cNvPr id="4" name="Picture 3"/>
-          <p:cNvPicPr>
-            <a:picLocks noChangeAspect="1"/>
-          </p:cNvPicPr>
-          <p:nvPr/>
-        </p:nvPicPr>
-        <p:blipFill>
-          <a:blip r:embed="rId2"/>
-          <a:stretch>
-            <a:fillRect/>
-          </a:stretch>
-        </p:blipFill>
-        <p:spPr>
-          <a:xfrm>
-            <a:off x="8474189" y="287560"/>
-            <a:ext cx="3407286" cy="5301737"/>
-          </a:xfrm>
-          <a:prstGeom prst="rect">
-            <a:avLst/>
-          </a:prstGeom>
-        </p:spPr>
-      </p:pic>
       <p:grpSp>
         <p:nvGrpSpPr>
           <p:cNvPr id="22" name="Group 21"/>
@@ -12165,41 +12164,12 @@
         </p:nvGrpSpPr>
         <p:grpSpPr>
           <a:xfrm>
-            <a:off x="145072" y="2700348"/>
-            <a:ext cx="7946341" cy="2888949"/>
-            <a:chOff x="145072" y="2700348"/>
-            <a:chExt cx="7946341" cy="2888949"/>
+            <a:off x="145072" y="2898758"/>
+            <a:ext cx="4890211" cy="984885"/>
+            <a:chOff x="145072" y="2898758"/>
+            <a:chExt cx="4890211" cy="984885"/>
           </a:xfrm>
         </p:grpSpPr>
-        <p:pic>
-          <p:nvPicPr>
-            <p:cNvPr id="5" name="Picture 4"/>
-            <p:cNvPicPr>
-              <a:picLocks noChangeAspect="1"/>
-            </p:cNvPicPr>
-            <p:nvPr/>
-          </p:nvPicPr>
-          <p:blipFill rotWithShape="1">
-            <a:blip r:embed="rId3">
-              <a:extLst>
-                <a:ext uri="{28A0092B-C50C-407E-A947-70E740481C1C}">
-                  <a14:useLocalDpi xmlns:a14="http://schemas.microsoft.com/office/drawing/2010/main" val="0"/>
-                </a:ext>
-              </a:extLst>
-            </a:blip>
-            <a:srcRect r="32710"/>
-            <a:stretch/>
-          </p:blipFill>
-          <p:spPr>
-            <a:xfrm>
-              <a:off x="4558591" y="2700348"/>
-              <a:ext cx="3532822" cy="2888949"/>
-            </a:xfrm>
-            <a:prstGeom prst="rect">
-              <a:avLst/>
-            </a:prstGeom>
-          </p:spPr>
-        </p:pic>
         <p:sp>
           <p:nvSpPr>
             <p:cNvPr id="8" name="Rectangle 7"/>
@@ -12267,7 +12237,7 @@
           <p:spPr>
             <a:xfrm>
               <a:off x="3544834" y="3391201"/>
-              <a:ext cx="1606241" cy="56545"/>
+              <a:ext cx="1490449" cy="43768"/>
             </a:xfrm>
             <a:prstGeom prst="straightConnector1">
               <a:avLst/>
@@ -12300,10 +12270,10 @@
         </p:nvGrpSpPr>
         <p:grpSpPr>
           <a:xfrm>
-            <a:off x="145072" y="4071822"/>
-            <a:ext cx="5006003" cy="1005348"/>
-            <a:chOff x="145072" y="4071822"/>
-            <a:chExt cx="5006003" cy="1005348"/>
+            <a:off x="145072" y="4039936"/>
+            <a:ext cx="5006003" cy="1037234"/>
+            <a:chOff x="145072" y="4039936"/>
+            <a:chExt cx="5006003" cy="1037234"/>
           </a:xfrm>
         </p:grpSpPr>
         <p:sp>
@@ -12372,8 +12342,8 @@
           </p:nvCxnSpPr>
           <p:spPr>
             <a:xfrm flipV="1">
-              <a:off x="4137318" y="4267184"/>
-              <a:ext cx="1013757" cy="307312"/>
+              <a:off x="4137318" y="4039936"/>
+              <a:ext cx="1013757" cy="534560"/>
             </a:xfrm>
             <a:prstGeom prst="straightConnector1">
               <a:avLst/>
@@ -12398,6 +12368,30 @@
           </p:style>
         </p:cxnSp>
       </p:grpSp>
+      <p:pic>
+        <p:nvPicPr>
+          <p:cNvPr id="6" name="Picture 5"/>
+          <p:cNvPicPr>
+            <a:picLocks noChangeAspect="1"/>
+          </p:cNvPicPr>
+          <p:nvPr/>
+        </p:nvPicPr>
+        <p:blipFill>
+          <a:blip r:embed="rId3"/>
+          <a:stretch>
+            <a:fillRect/>
+          </a:stretch>
+        </p:blipFill>
+        <p:spPr>
+          <a:xfrm>
+            <a:off x="8512686" y="648997"/>
+            <a:ext cx="3175000" cy="4940300"/>
+          </a:xfrm>
+          <a:prstGeom prst="rect">
+            <a:avLst/>
+          </a:prstGeom>
+        </p:spPr>
+      </p:pic>
     </p:spTree>
     <p:extLst>
       <p:ext uri="{BB962C8B-B14F-4D97-AF65-F5344CB8AC3E}">

</xml_diff>